<commit_message>
Fix lecture 02 slides.
</commit_message>
<xml_diff>
--- a/bishops/cs321/resources/CS321_Lecture_02.pptx
+++ b/bishops/cs321/resources/CS321_Lecture_02.pptx
@@ -361,7 +361,7 @@
             <a:pPr indent="0" algn="r">
               <a:buNone/>
             </a:pPr>
-            <a:fld id="{AF102237-F071-4C2F-A1DE-B6F6EF1BFD08}" type="slidenum">
+            <a:fld id="{8C82023F-69FC-4934-AEC6-7FF9F6043CB9}" type="slidenum">
               <a:rPr b="0" lang="en-CA" sz="1400" spc="-1" strike="noStrike">
                 <a:solidFill>
                   <a:srgbClr val="000000"/>
@@ -526,7 +526,7 @@
               </a:lnSpc>
               <a:buNone/>
             </a:pPr>
-            <a:fld id="{1D52816E-C4CA-4A21-9177-4DEB0C8EDCED}" type="slidenum">
+            <a:fld id="{09A6F262-4AE4-4710-A70A-3655E0EF7617}" type="slidenum">
               <a:rPr b="0" lang="en-CA" sz="1200" spc="-1" strike="noStrike">
                 <a:solidFill>
                   <a:schemeClr val="dk1"/>
@@ -534,7 +534,7 @@
                 <a:latin typeface="+mn-lt"/>
                 <a:ea typeface="+mn-ea"/>
               </a:rPr>
-              <a:t>24</a:t>
+              <a:t>&lt;number&gt;</a:t>
             </a:fld>
             <a:endParaRPr b="0" lang="en-CA" sz="1200" spc="-1" strike="noStrike">
               <a:solidFill>
@@ -601,7 +601,7 @@
         <p:txBody>
           <a:bodyPr/>
           <a:p>
-            <a:fld id="{A300ED0A-8278-4CE3-8EC6-915F903521D8}" type="slidenum">
+            <a:fld id="{854278A0-09A9-4FD0-8D89-4A9649C9AA21}" type="slidenum">
               <a:t>&lt;#&gt;</a:t>
             </a:fld>
           </a:p>
@@ -816,7 +816,7 @@
         <p:txBody>
           <a:bodyPr/>
           <a:p>
-            <a:fld id="{1D98A4DF-EE6F-4AA8-82DE-F0A1439932EE}" type="slidenum">
+            <a:fld id="{B132CF5C-8C6F-4B7A-97AB-1093168CCFC4}" type="slidenum">
               <a:t>&lt;#&gt;</a:t>
             </a:fld>
           </a:p>
@@ -1123,7 +1123,7 @@
         <p:txBody>
           <a:bodyPr/>
           <a:p>
-            <a:fld id="{07BE78B9-8A19-4BFB-ADFF-075E9C00E734}" type="slidenum">
+            <a:fld id="{03043591-0748-4BC3-99B7-F0FEB07AF61A}" type="slidenum">
               <a:t>&lt;#&gt;</a:t>
             </a:fld>
           </a:p>
@@ -1522,7 +1522,7 @@
         <p:txBody>
           <a:bodyPr/>
           <a:p>
-            <a:fld id="{05B67172-8290-4B74-B4C6-C3E1230BF972}" type="slidenum">
+            <a:fld id="{E480390A-F7DC-407C-8C9B-50960863CADB}" type="slidenum">
               <a:t>&lt;#&gt;</a:t>
             </a:fld>
           </a:p>
@@ -1685,7 +1685,7 @@
         <p:txBody>
           <a:bodyPr/>
           <a:p>
-            <a:fld id="{92E2D593-979C-4EB9-9169-F9A91942AF57}" type="slidenum">
+            <a:fld id="{8D090296-7281-4DF0-881B-94A93AA96A42}" type="slidenum">
               <a:t>&lt;#&gt;</a:t>
             </a:fld>
           </a:p>
@@ -1854,7 +1854,7 @@
         <p:txBody>
           <a:bodyPr/>
           <a:p>
-            <a:fld id="{FBC39972-14D3-4C3B-A5C1-1B73F525976C}" type="slidenum">
+            <a:fld id="{B569722E-8F61-457C-80CD-7D3E45262A1B}" type="slidenum">
               <a:t>&lt;#&gt;</a:t>
             </a:fld>
           </a:p>
@@ -2069,7 +2069,7 @@
         <p:txBody>
           <a:bodyPr/>
           <a:p>
-            <a:fld id="{214F393C-D2CE-46F8-AE9C-A7D57D7C61DD}" type="slidenum">
+            <a:fld id="{515077DB-F855-4AE3-B3BE-651905391F4F}" type="slidenum">
               <a:t>&lt;#&gt;</a:t>
             </a:fld>
           </a:p>
@@ -2192,7 +2192,7 @@
         <p:txBody>
           <a:bodyPr/>
           <a:p>
-            <a:fld id="{65460706-7DFA-4D40-921E-A6520FE0954B}" type="slidenum">
+            <a:fld id="{E3069FF3-CE59-4DE0-8D3B-C36448C2FFE7}" type="slidenum">
               <a:t>&lt;#&gt;</a:t>
             </a:fld>
           </a:p>
@@ -2313,7 +2313,7 @@
         <p:txBody>
           <a:bodyPr/>
           <a:p>
-            <a:fld id="{0118EFC0-498F-4C1C-889C-F6D0D4E08F84}" type="slidenum">
+            <a:fld id="{02381DB5-1905-4FD5-9382-7CE40F93BEF2}" type="slidenum">
               <a:t>&lt;#&gt;</a:t>
             </a:fld>
           </a:p>
@@ -2574,7 +2574,7 @@
         <p:txBody>
           <a:bodyPr/>
           <a:p>
-            <a:fld id="{404536F8-6548-45D8-A286-625B87AF17CF}" type="slidenum">
+            <a:fld id="{B70035A6-9BF0-47F0-AA34-5F6B226D2A75}" type="slidenum">
               <a:t>&lt;#&gt;</a:t>
             </a:fld>
           </a:p>
@@ -2835,7 +2835,7 @@
         <p:txBody>
           <a:bodyPr/>
           <a:p>
-            <a:fld id="{DF2895C7-FB50-4C7F-9CA8-3843BC572E17}" type="slidenum">
+            <a:fld id="{13108C6E-2CC8-455F-883E-969F23C343C8}" type="slidenum">
               <a:t>&lt;#&gt;</a:t>
             </a:fld>
           </a:p>
@@ -3096,7 +3096,7 @@
         <p:txBody>
           <a:bodyPr/>
           <a:p>
-            <a:fld id="{7CCF905C-2DD7-4FED-868F-1DDC75193BC8}" type="slidenum">
+            <a:fld id="{08B0A0A7-A39D-42AE-8549-EB4C1A8A9068}" type="slidenum">
               <a:t>&lt;#&gt;</a:t>
             </a:fld>
           </a:p>
@@ -3282,7 +3282,7 @@
                 </a:solidFill>
                 <a:latin typeface="Calibri"/>
               </a:rPr>
-              <a:t> </a:t>
+              <a:t>&lt;date/time&gt;</a:t>
             </a:r>
             <a:endParaRPr b="0" lang="en-CA" sz="1200" spc="-1" strike="noStrike">
               <a:solidFill>
@@ -3348,7 +3348,7 @@
                 </a:solidFill>
                 <a:latin typeface="Calibri"/>
               </a:rPr>
-              <a:t> </a:t>
+              <a:t>&lt;footer&gt;</a:t>
             </a:r>
             <a:endParaRPr b="0" lang="en-CA" sz="1200" spc="-1" strike="noStrike">
               <a:solidFill>
@@ -3407,14 +3407,14 @@
               </a:lnSpc>
               <a:buNone/>
             </a:pPr>
-            <a:fld id="{D71AD777-A65E-4F9C-9308-B9D343171B26}" type="slidenum">
+            <a:fld id="{F3415CDD-C3FA-4679-8E85-483BE19FE57D}" type="slidenum">
               <a:rPr b="0" lang="en-CA" sz="1200" spc="-1" strike="noStrike">
                 <a:solidFill>
                   <a:schemeClr val="lt1"/>
                 </a:solidFill>
                 <a:latin typeface="Calibri"/>
               </a:rPr>
-              <a:t>1</a:t>
+              <a:t>&lt;number&gt;</a:t>
             </a:fld>
             <a:endParaRPr b="0" lang="en-CA" sz="1200" spc="-1" strike="noStrike">
               <a:solidFill>
@@ -4483,14 +4483,14 @@
               </a:lnSpc>
               <a:buNone/>
             </a:pPr>
-            <a:fld id="{7E8956A0-F60F-4879-AD47-531AB8ED43ED}" type="slidenum">
+            <a:fld id="{DEC26100-2B44-4B9B-8DA5-3FCE93A0EB58}" type="slidenum">
               <a:rPr b="0" lang="en-CA" sz="1200" spc="-1" strike="noStrike">
                 <a:solidFill>
                   <a:schemeClr val="lt1"/>
                 </a:solidFill>
                 <a:latin typeface="Calibri"/>
               </a:rPr>
-              <a:t>10</a:t>
+              <a:t>&lt;number&gt;</a:t>
             </a:fld>
             <a:r>
               <a:rPr b="0" lang="en-CA" sz="1200" spc="-1" strike="noStrike">
@@ -4964,14 +4964,14 @@
               </a:lnSpc>
               <a:buNone/>
             </a:pPr>
-            <a:fld id="{5B52D964-B9C7-4734-9BC3-65AC2CC548F3}" type="slidenum">
+            <a:fld id="{4A1E8A0C-2272-4984-9398-44F81F93D1CF}" type="slidenum">
               <a:rPr b="0" lang="en-CA" sz="1200" spc="-1" strike="noStrike">
                 <a:solidFill>
                   <a:schemeClr val="lt1"/>
                 </a:solidFill>
                 <a:latin typeface="Calibri"/>
               </a:rPr>
-              <a:t>11</a:t>
+              <a:t>&lt;number&gt;</a:t>
             </a:fld>
             <a:r>
               <a:rPr b="0" lang="en-CA" sz="1200" spc="-1" strike="noStrike">
@@ -5454,14 +5454,14 @@
               </a:lnSpc>
               <a:buNone/>
             </a:pPr>
-            <a:fld id="{C9F138E6-F904-4063-BD7B-2EB4AD871251}" type="slidenum">
+            <a:fld id="{FE4AF6E3-D54C-43A6-BE8B-A88AE7460885}" type="slidenum">
               <a:rPr b="0" lang="en-CA" sz="1200" spc="-1" strike="noStrike">
                 <a:solidFill>
                   <a:schemeClr val="lt1"/>
                 </a:solidFill>
                 <a:latin typeface="Calibri"/>
               </a:rPr>
-              <a:t>12</a:t>
+              <a:t>&lt;number&gt;</a:t>
             </a:fld>
             <a:r>
               <a:rPr b="0" lang="en-CA" sz="1200" spc="-1" strike="noStrike">
@@ -6273,14 +6273,14 @@
               </a:lnSpc>
               <a:buNone/>
             </a:pPr>
-            <a:fld id="{4D82B382-00DB-4F27-9886-169A7F9C00DF}" type="slidenum">
+            <a:fld id="{85F00197-72DC-4326-9A79-FCF05B153E5C}" type="slidenum">
               <a:rPr b="0" lang="en-CA" sz="1200" spc="-1" strike="noStrike">
                 <a:solidFill>
                   <a:schemeClr val="lt1"/>
                 </a:solidFill>
                 <a:latin typeface="Calibri"/>
               </a:rPr>
-              <a:t>12</a:t>
+              <a:t>&lt;number&gt;</a:t>
             </a:fld>
             <a:r>
               <a:rPr b="0" lang="en-CA" sz="1200" spc="-1" strike="noStrike">
@@ -9142,14 +9142,14 @@
               </a:lnSpc>
               <a:buNone/>
             </a:pPr>
-            <a:fld id="{F2EEF690-2776-41B0-8C42-25305637597E}" type="slidenum">
+            <a:fld id="{E32C97C3-1151-4201-8BBB-DD5331AF34E3}" type="slidenum">
               <a:rPr b="0" lang="en-CA" sz="1200" spc="-1" strike="noStrike">
                 <a:solidFill>
                   <a:schemeClr val="lt1"/>
                 </a:solidFill>
                 <a:latin typeface="Calibri"/>
               </a:rPr>
-              <a:t>14</a:t>
+              <a:t>&lt;number&gt;</a:t>
             </a:fld>
             <a:r>
               <a:rPr b="0" lang="en-CA" sz="1200" spc="-1" strike="noStrike">
@@ -9458,14 +9458,14 @@
               </a:lnSpc>
               <a:buNone/>
             </a:pPr>
-            <a:fld id="{7B7D5488-CB80-4E6F-AE25-6790FFE0A30C}" type="slidenum">
+            <a:fld id="{EB30B21F-DC5A-4AC0-A0E2-522CE70D99FA}" type="slidenum">
               <a:rPr b="0" lang="en-CA" sz="1200" spc="-1" strike="noStrike">
                 <a:solidFill>
                   <a:schemeClr val="lt1"/>
                 </a:solidFill>
                 <a:latin typeface="Calibri"/>
               </a:rPr>
-              <a:t>15</a:t>
+              <a:t>&lt;number&gt;</a:t>
             </a:fld>
             <a:r>
               <a:rPr b="0" lang="en-CA" sz="1200" spc="-1" strike="noStrike">
@@ -9783,14 +9783,14 @@
               </a:lnSpc>
               <a:buNone/>
             </a:pPr>
-            <a:fld id="{6BFBBFAC-3A8C-4A99-BCDF-3F6085E5B32A}" type="slidenum">
+            <a:fld id="{BBE4AA9D-3C31-4D57-B88D-1EECDFC66E0D}" type="slidenum">
               <a:rPr b="0" lang="en-CA" sz="1200" spc="-1" strike="noStrike">
                 <a:solidFill>
                   <a:schemeClr val="lt1"/>
                 </a:solidFill>
                 <a:latin typeface="Calibri"/>
               </a:rPr>
-              <a:t>15</a:t>
+              <a:t>&lt;number&gt;</a:t>
             </a:fld>
             <a:r>
               <a:rPr b="0" lang="en-CA" sz="1200" spc="-1" strike="noStrike">
@@ -10866,14 +10866,14 @@
               </a:lnSpc>
               <a:buNone/>
             </a:pPr>
-            <a:fld id="{82D71F8E-642D-4081-9D55-550504DFC16B}" type="slidenum">
+            <a:fld id="{561F5DF1-A482-4449-8036-EBB668120955}" type="slidenum">
               <a:rPr b="0" lang="en-CA" sz="1200" spc="-1" strike="noStrike">
                 <a:solidFill>
                   <a:schemeClr val="lt1"/>
                 </a:solidFill>
                 <a:latin typeface="Calibri"/>
               </a:rPr>
-              <a:t>17</a:t>
+              <a:t>&lt;number&gt;</a:t>
             </a:fld>
             <a:r>
               <a:rPr b="0" lang="en-CA" sz="1200" spc="-1" strike="noStrike">
@@ -11043,14 +11043,14 @@
               </a:lnSpc>
               <a:buNone/>
             </a:pPr>
-            <a:fld id="{EEF82AAE-9AD5-4DC2-85D1-A6F73B1A8CF1}" type="slidenum">
+            <a:fld id="{1B49ECED-17E8-423A-81B2-0A52928D8A77}" type="slidenum">
               <a:rPr b="0" lang="en-CA" sz="1200" spc="-1" strike="noStrike">
                 <a:solidFill>
                   <a:schemeClr val="lt1"/>
                 </a:solidFill>
                 <a:latin typeface="Calibri"/>
               </a:rPr>
-              <a:t>17</a:t>
+              <a:t>&lt;number&gt;</a:t>
             </a:fld>
             <a:r>
               <a:rPr b="0" lang="en-CA" sz="1200" spc="-1" strike="noStrike">
@@ -13510,14 +13510,14 @@
               </a:lnSpc>
               <a:buNone/>
             </a:pPr>
-            <a:fld id="{E7AFB680-91FF-4023-A5E4-EE2413D352F5}" type="slidenum">
+            <a:fld id="{D30C3D63-16B1-47CE-B988-45242CBE8895}" type="slidenum">
               <a:rPr b="0" lang="en-CA" sz="1200" spc="-1" strike="noStrike">
                 <a:solidFill>
                   <a:schemeClr val="lt1"/>
                 </a:solidFill>
                 <a:latin typeface="Calibri"/>
               </a:rPr>
-              <a:t>19</a:t>
+              <a:t>&lt;number&gt;</a:t>
             </a:fld>
             <a:r>
               <a:rPr b="0" lang="en-CA" sz="1200" spc="-1" strike="noStrike">
@@ -14409,7 +14409,7 @@
               </a:lnSpc>
               <a:buNone/>
             </a:pPr>
-            <a:fld id="{B1018382-BA7E-4BED-A069-34FDC15C39E5}" type="slidenum">
+            <a:fld id="{9CAEE665-A3E2-4109-B02C-39A0D4127ABD}" type="slidenum">
               <a:rPr b="0" lang="en-CA" sz="1200" spc="-1" strike="noStrike">
                 <a:solidFill>
                   <a:schemeClr val="lt1"/>
@@ -14893,14 +14893,14 @@
               </a:lnSpc>
               <a:buNone/>
             </a:pPr>
-            <a:fld id="{FF20C855-823E-4676-9249-A7CF23AA289C}" type="slidenum">
+            <a:fld id="{B047A33E-657C-45CA-9047-15CF9D4DB26A}" type="slidenum">
               <a:rPr b="0" lang="en-CA" sz="1200" spc="-1" strike="noStrike">
                 <a:solidFill>
                   <a:schemeClr val="lt1"/>
                 </a:solidFill>
                 <a:latin typeface="Calibri"/>
               </a:rPr>
-              <a:t>20</a:t>
+              <a:t>&lt;number&gt;</a:t>
             </a:fld>
             <a:r>
               <a:rPr b="0" lang="en-CA" sz="1200" spc="-1" strike="noStrike">
@@ -15309,7 +15309,7 @@
               </a:lnSpc>
               <a:buNone/>
             </a:pPr>
-            <a:fld id="{CFD8BCF3-5837-43AD-9470-7B151152AA50}" type="slidenum">
+            <a:fld id="{E04D4B73-A408-4B42-8DEA-7F1E881FCBB8}" type="slidenum">
               <a:rPr b="0" lang="en-CA" sz="1200" spc="-1" strike="noStrike">
                 <a:solidFill>
                   <a:schemeClr val="lt1"/>
@@ -15914,14 +15914,14 @@
               </a:lnSpc>
               <a:buNone/>
             </a:pPr>
-            <a:fld id="{F6B04C46-1FAB-472C-91CF-2A44EA83C435}" type="slidenum">
+            <a:fld id="{9E9EBACB-28AF-4E11-90C8-EB3EFA3937DE}" type="slidenum">
               <a:rPr b="0" lang="en-CA" sz="1200" spc="-1" strike="noStrike">
                 <a:solidFill>
                   <a:schemeClr val="lt1"/>
                 </a:solidFill>
                 <a:latin typeface="Calibri"/>
               </a:rPr>
-              <a:t>22</a:t>
+              <a:t>&lt;number&gt;</a:t>
             </a:fld>
             <a:r>
               <a:rPr b="0" lang="en-CA" sz="1200" spc="-1" strike="noStrike">
@@ -16652,14 +16652,14 @@
               </a:lnSpc>
               <a:buNone/>
             </a:pPr>
-            <a:fld id="{7EF17B9D-54E0-4BD3-AE44-F3A5A5DA6B3F}" type="slidenum">
+            <a:fld id="{21A56B7A-9137-4459-9B6B-4E8638A9E683}" type="slidenum">
               <a:rPr b="0" lang="en-CA" sz="1200" spc="-1" strike="noStrike">
                 <a:solidFill>
                   <a:schemeClr val="lt1"/>
                 </a:solidFill>
                 <a:latin typeface="Calibri"/>
               </a:rPr>
-              <a:t>23</a:t>
+              <a:t>&lt;number&gt;</a:t>
             </a:fld>
             <a:r>
               <a:rPr b="0" lang="en-CA" sz="1200" spc="-1" strike="noStrike">
@@ -17210,14 +17210,14 @@
               </a:lnSpc>
               <a:buNone/>
             </a:pPr>
-            <a:fld id="{8A7ABB22-2871-4B1D-AB74-D263A7B68230}" type="slidenum">
+            <a:fld id="{5F36A2BC-7DF2-4DB0-A000-2CF7AE25DA95}" type="slidenum">
               <a:rPr b="0" lang="en-CA" sz="1200" spc="-1" strike="noStrike">
                 <a:solidFill>
                   <a:schemeClr val="lt1"/>
                 </a:solidFill>
                 <a:latin typeface="Calibri"/>
               </a:rPr>
-              <a:t>24</a:t>
+              <a:t>&lt;number&gt;</a:t>
             </a:fld>
             <a:r>
               <a:rPr b="0" lang="en-CA" sz="1200" spc="-1" strike="noStrike">
@@ -18464,7 +18464,7 @@
               </a:lnSpc>
               <a:buNone/>
             </a:pPr>
-            <a:fld id="{423D7B7C-7094-49A8-AEBA-661BCA41E3C1}" type="slidenum">
+            <a:fld id="{5DFB1B87-9F75-404A-9B0D-26C9578902DF}" type="slidenum">
               <a:rPr b="0" lang="en-CA" sz="1200" spc="-1" strike="noStrike">
                 <a:solidFill>
                   <a:schemeClr val="lt1"/>
@@ -19652,7 +19652,7 @@
               </a:lnSpc>
               <a:buNone/>
             </a:pPr>
-            <a:fld id="{55024593-FAD1-43CE-B146-C7694677086E}" type="slidenum">
+            <a:fld id="{B88F29D7-1AB7-4670-87EE-8999BE431D62}" type="slidenum">
               <a:rPr b="0" lang="en-CA" sz="1200" spc="-1" strike="noStrike">
                 <a:solidFill>
                   <a:schemeClr val="lt1"/>
@@ -19918,7 +19918,7 @@
               </a:lnSpc>
               <a:buNone/>
             </a:pPr>
-            <a:fld id="{D79F5E5D-FF62-4712-BD8B-48A93970536C}" type="slidenum">
+            <a:fld id="{7765890F-9288-4E37-81C7-7B49D5F2690F}" type="slidenum">
               <a:rPr b="0" lang="en-CA" sz="1200" spc="-1" strike="noStrike">
                 <a:solidFill>
                   <a:schemeClr val="lt1"/>
@@ -20784,7 +20784,7 @@
               </a:lnSpc>
               <a:buNone/>
             </a:pPr>
-            <a:fld id="{F0D321DD-2E32-432B-AE83-BFC5557993F7}" type="slidenum">
+            <a:fld id="{F48171B4-C1C4-4E92-8179-9503660AF8EE}" type="slidenum">
               <a:rPr b="0" lang="en-CA" sz="1200" spc="-1" strike="noStrike">
                 <a:solidFill>
                   <a:schemeClr val="lt1"/>
@@ -21007,7 +21007,7 @@
               </a:lnSpc>
               <a:buNone/>
             </a:pPr>
-            <a:fld id="{29CB636F-D97F-4F90-9A8F-F5D4AB2501D1}" type="slidenum">
+            <a:fld id="{CB34B397-AD0F-4D93-9968-D998CA1E8C08}" type="slidenum">
               <a:rPr b="0" lang="en-CA" sz="1200" spc="-1" strike="noStrike">
                 <a:solidFill>
                   <a:schemeClr val="lt1"/>
@@ -21424,7 +21424,7 @@
               </a:lnSpc>
               <a:buNone/>
             </a:pPr>
-            <a:fld id="{72D9C6B2-0985-423E-82FB-2298C84869B5}" type="slidenum">
+            <a:fld id="{1E6FCA5F-C120-49EA-8B6A-3FF2389B622B}" type="slidenum">
               <a:rPr b="0" lang="en-CA" sz="1200" spc="-1" strike="noStrike">
                 <a:solidFill>
                   <a:schemeClr val="lt1"/>
@@ -22698,14 +22698,14 @@
               </a:lnSpc>
               <a:buNone/>
             </a:pPr>
-            <a:fld id="{AFACCFE0-5E0B-4A7D-895F-D61AB54B2A79}" type="slidenum">
+            <a:fld id="{6CD25FBB-CCF9-482D-A200-611BF82F6E86}" type="slidenum">
               <a:rPr b="0" lang="en-CA" sz="1200" spc="-1" strike="noStrike">
                 <a:solidFill>
                   <a:schemeClr val="lt1"/>
                 </a:solidFill>
                 <a:latin typeface="Calibri"/>
               </a:rPr>
-              <a:t>9</a:t>
+              <a:t>&lt;number&gt;</a:t>
             </a:fld>
             <a:r>
               <a:rPr b="0" lang="en-CA" sz="1200" spc="-1" strike="noStrike">

</xml_diff>